<commit_message>
[fix] Updated images and corrected spellings
</commit_message>
<xml_diff>
--- a/segunda_etapa/Apresentação de case_  Engenheiro de dados CERC.pptx
+++ b/segunda_etapa/Apresentação de case_  Engenheiro de dados CERC.pptx
@@ -7817,32 +7817,7 @@
             </a:pPr>
             <a:r>
               <a:rPr lang="en" sz="1300"/>
-              <a:t>O código para a primeira etapa do desafio pode ser encontrado no meu </a:t>
-            </a:r>
-            <a:r>
-              <a:rPr lang="en" sz="1300" u="sng">
-                <a:solidFill>
-                  <a:schemeClr val="hlink"/>
-                </a:solidFill>
-                <a:hlinkClick r:id="rId3"/>
-              </a:rPr>
-              <a:t>github</a:t>
-            </a:r>
-            <a:endParaRPr sz="1300"/>
-          </a:p>
-          <a:p>
-            <a:pPr indent="0" lvl="0" marL="0" rtl="0" algn="l">
-              <a:spcBef>
-                <a:spcPts val="1200"/>
-              </a:spcBef>
-              <a:spcAft>
-                <a:spcPts val="0"/>
-              </a:spcAft>
-              <a:buNone/>
-            </a:pPr>
-            <a:r>
-              <a:rPr lang="en" sz="1300"/>
-              <a:t>Algumas observações acerca da primeira etapa do case:</a:t>
+              <a:t>Principais desafio:</a:t>
             </a:r>
             <a:endParaRPr sz="1300"/>
           </a:p>
@@ -7860,6 +7835,31 @@
             <a:r>
               <a:rPr lang="en" sz="1300"/>
               <a:t>O código não continha muita dificuldade técnica. Portanto, o maior esforço foi voltado a garantia da limpeza do código, boas práticas de programação e documentação</a:t>
+            </a:r>
+            <a:endParaRPr sz="1300"/>
+          </a:p>
+          <a:p>
+            <a:pPr indent="0" lvl="0" marL="0" rtl="0" algn="l">
+              <a:spcBef>
+                <a:spcPts val="1200"/>
+              </a:spcBef>
+              <a:spcAft>
+                <a:spcPts val="1200"/>
+              </a:spcAft>
+              <a:buNone/>
+            </a:pPr>
+            <a:r>
+              <a:rPr lang="en" sz="1300"/>
+              <a:t>O código para a primeira etapa do desafio pode ser encontrado no meu </a:t>
+            </a:r>
+            <a:r>
+              <a:rPr lang="en" sz="1300" u="sng">
+                <a:solidFill>
+                  <a:schemeClr val="hlink"/>
+                </a:solidFill>
+                <a:hlinkClick r:id="rId3"/>
+              </a:rPr>
+              <a:t>github</a:t>
             </a:r>
             <a:endParaRPr sz="1300"/>
           </a:p>
@@ -7964,7 +7964,7 @@
             </a:pPr>
             <a:r>
               <a:rPr lang="en" sz="1300"/>
-              <a:t>Esta etapa propõe a elaboração de um desenho arquitetural para um Data Lake</a:t>
+              <a:t>Esta etapa propõe a elaboração de um desenho de uma arquitetura para criação de um Data Lake</a:t>
             </a:r>
             <a:endParaRPr sz="1300"/>
           </a:p>
@@ -8032,6 +8032,23 @@
             <a:r>
               <a:rPr lang="en" sz="1300"/>
               <a:t>A ingestão dos dados ocorrerá em lotes (batch), e não via streaming.</a:t>
+            </a:r>
+            <a:endParaRPr sz="1300"/>
+          </a:p>
+          <a:p>
+            <a:pPr indent="-311150" lvl="0" marL="457200" rtl="0" algn="l">
+              <a:spcBef>
+                <a:spcPts val="0"/>
+              </a:spcBef>
+              <a:spcAft>
+                <a:spcPts val="0"/>
+              </a:spcAft>
+              <a:buSzPts val="1300"/>
+              <a:buChar char="-"/>
+            </a:pPr>
+            <a:r>
+              <a:rPr lang="en" sz="1300"/>
+              <a:t>O desenho inicial não foi realizado com nenhum ambiente específico em mente (AWS, Azure, GCP, Databricks)</a:t>
             </a:r>
             <a:endParaRPr sz="1300"/>
           </a:p>
@@ -8122,7 +8139,7 @@
             <a:tbl>
               <a:tblPr>
                 <a:noFill/>
-                <a:tableStyleId>{B74F85E3-00B8-4A32-9C26-43B8D3FC8817}</a:tableStyleId>
+                <a:tableStyleId>{E7A4A8B9-0FB2-434F-99BD-7BA3C1D40BA7}</a:tableStyleId>
               </a:tblPr>
               <a:tblGrid>
                 <a:gridCol w="4191000"/>
@@ -8595,7 +8612,7 @@
       </p:grpSpPr>
       <p:pic>
         <p:nvPicPr>
-          <p:cNvPr id="92" name="Google Shape;92;p17" title="cerc-dataleke-architecture.png"/>
+          <p:cNvPr id="92" name="Google Shape;92;p17" title="cerc-datalake-architecture.png"/>
           <p:cNvPicPr preferRelativeResize="0"/>
           <p:nvPr/>
         </p:nvPicPr>
@@ -8981,7 +8998,7 @@
             <a:tbl>
               <a:tblPr>
                 <a:noFill/>
-                <a:tableStyleId>{B74F85E3-00B8-4A32-9C26-43B8D3FC8817}</a:tableStyleId>
+                <a:tableStyleId>{E7A4A8B9-0FB2-434F-99BD-7BA3C1D40BA7}</a:tableStyleId>
               </a:tblPr>
               <a:tblGrid>
                 <a:gridCol w="4302750"/>
@@ -9614,13 +9631,12 @@
           <p:cNvPicPr preferRelativeResize="0"/>
           <p:nvPr/>
         </p:nvPicPr>
-        <p:blipFill>
+        <p:blipFill rotWithShape="1">
           <a:blip r:embed="rId3">
             <a:alphaModFix/>
           </a:blip>
-          <a:stretch>
-            <a:fillRect/>
-          </a:stretch>
+          <a:srcRect b="0" l="0" r="0" t="0"/>
+          <a:stretch/>
         </p:blipFill>
         <p:spPr>
           <a:xfrm>

</xml_diff>